<commit_message>
Adding presentation slide deck.pptx
</commit_message>
<xml_diff>
--- a/presentation slide deck.pptx
+++ b/presentation slide deck.pptx
@@ -10,7 +10,6 @@
     <p:sldId id="258" r:id="rId4"/>
     <p:sldId id="259" r:id="rId5"/>
     <p:sldId id="260" r:id="rId6"/>
-    <p:sldId id="261" r:id="rId7"/>
   </p:sldIdLst>
   <p:sldSz cx="12192000" cy="6858000"/>
   <p:notesSz cx="6858000" cy="9144000"/>
@@ -264,7 +263,7 @@
           <a:p>
             <a:fld id="{A8772C97-20F4-4C81-9859-95A3E31E8BE1}" type="datetimeFigureOut">
               <a:rPr lang="en-US" smtClean="0"/>
-              <a:t>12/3/2019</a:t>
+              <a:t>5/7/2020</a:t>
             </a:fld>
             <a:endParaRPr lang="en-US"/>
           </a:p>
@@ -462,7 +461,7 @@
           <a:p>
             <a:fld id="{A8772C97-20F4-4C81-9859-95A3E31E8BE1}" type="datetimeFigureOut">
               <a:rPr lang="en-US" smtClean="0"/>
-              <a:t>12/3/2019</a:t>
+              <a:t>5/7/2020</a:t>
             </a:fld>
             <a:endParaRPr lang="en-US"/>
           </a:p>
@@ -670,7 +669,7 @@
           <a:p>
             <a:fld id="{A8772C97-20F4-4C81-9859-95A3E31E8BE1}" type="datetimeFigureOut">
               <a:rPr lang="en-US" smtClean="0"/>
-              <a:t>12/3/2019</a:t>
+              <a:t>5/7/2020</a:t>
             </a:fld>
             <a:endParaRPr lang="en-US"/>
           </a:p>
@@ -868,7 +867,7 @@
           <a:p>
             <a:fld id="{A8772C97-20F4-4C81-9859-95A3E31E8BE1}" type="datetimeFigureOut">
               <a:rPr lang="en-US" smtClean="0"/>
-              <a:t>12/3/2019</a:t>
+              <a:t>5/7/2020</a:t>
             </a:fld>
             <a:endParaRPr lang="en-US"/>
           </a:p>
@@ -1143,7 +1142,7 @@
           <a:p>
             <a:fld id="{A8772C97-20F4-4C81-9859-95A3E31E8BE1}" type="datetimeFigureOut">
               <a:rPr lang="en-US" smtClean="0"/>
-              <a:t>12/3/2019</a:t>
+              <a:t>5/7/2020</a:t>
             </a:fld>
             <a:endParaRPr lang="en-US"/>
           </a:p>
@@ -1408,7 +1407,7 @@
           <a:p>
             <a:fld id="{A8772C97-20F4-4C81-9859-95A3E31E8BE1}" type="datetimeFigureOut">
               <a:rPr lang="en-US" smtClean="0"/>
-              <a:t>12/3/2019</a:t>
+              <a:t>5/7/2020</a:t>
             </a:fld>
             <a:endParaRPr lang="en-US"/>
           </a:p>
@@ -1820,7 +1819,7 @@
           <a:p>
             <a:fld id="{A8772C97-20F4-4C81-9859-95A3E31E8BE1}" type="datetimeFigureOut">
               <a:rPr lang="en-US" smtClean="0"/>
-              <a:t>12/3/2019</a:t>
+              <a:t>5/7/2020</a:t>
             </a:fld>
             <a:endParaRPr lang="en-US"/>
           </a:p>
@@ -1961,7 +1960,7 @@
           <a:p>
             <a:fld id="{A8772C97-20F4-4C81-9859-95A3E31E8BE1}" type="datetimeFigureOut">
               <a:rPr lang="en-US" smtClean="0"/>
-              <a:t>12/3/2019</a:t>
+              <a:t>5/7/2020</a:t>
             </a:fld>
             <a:endParaRPr lang="en-US"/>
           </a:p>
@@ -2074,7 +2073,7 @@
           <a:p>
             <a:fld id="{A8772C97-20F4-4C81-9859-95A3E31E8BE1}" type="datetimeFigureOut">
               <a:rPr lang="en-US" smtClean="0"/>
-              <a:t>12/3/2019</a:t>
+              <a:t>5/7/2020</a:t>
             </a:fld>
             <a:endParaRPr lang="en-US"/>
           </a:p>
@@ -2385,7 +2384,7 @@
           <a:p>
             <a:fld id="{A8772C97-20F4-4C81-9859-95A3E31E8BE1}" type="datetimeFigureOut">
               <a:rPr lang="en-US" smtClean="0"/>
-              <a:t>12/3/2019</a:t>
+              <a:t>5/7/2020</a:t>
             </a:fld>
             <a:endParaRPr lang="en-US"/>
           </a:p>
@@ -2673,7 +2672,7 @@
           <a:p>
             <a:fld id="{A8772C97-20F4-4C81-9859-95A3E31E8BE1}" type="datetimeFigureOut">
               <a:rPr lang="en-US" smtClean="0"/>
-              <a:t>12/3/2019</a:t>
+              <a:t>5/7/2020</a:t>
             </a:fld>
             <a:endParaRPr lang="en-US"/>
           </a:p>
@@ -2914,7 +2913,7 @@
           <a:p>
             <a:fld id="{A8772C97-20F4-4C81-9859-95A3E31E8BE1}" type="datetimeFigureOut">
               <a:rPr lang="en-US" smtClean="0"/>
-              <a:t>12/3/2019</a:t>
+              <a:t>5/7/2020</a:t>
             </a:fld>
             <a:endParaRPr lang="en-US"/>
           </a:p>
@@ -3317,6 +3316,14 @@
 <file path=ppt/slides/slide1.xml><?xml version="1.0" encoding="utf-8"?>
 <p:sld xmlns:a="http://schemas.openxmlformats.org/drawingml/2006/main" xmlns:r="http://schemas.openxmlformats.org/officeDocument/2006/relationships" xmlns:p="http://schemas.openxmlformats.org/presentationml/2006/main">
   <p:cSld>
+    <p:bg>
+      <p:bgPr>
+        <a:solidFill>
+          <a:schemeClr val="bg1"/>
+        </a:solidFill>
+        <a:effectLst/>
+      </p:bgPr>
+    </p:bg>
     <p:spTree>
       <p:nvGrpSpPr>
         <p:cNvPr id="1" name=""/>
@@ -3331,6 +3338,118 @@
           <a:chExt cx="0" cy="0"/>
         </a:xfrm>
       </p:grpSpPr>
+      <p:pic>
+        <p:nvPicPr>
+          <p:cNvPr id="4" name="Picture 2" descr="Full computer science curriculum and coding platform at no cost ...">
+            <a:extLst>
+              <a:ext uri="{FF2B5EF4-FFF2-40B4-BE49-F238E27FC236}">
+                <a16:creationId xmlns:a16="http://schemas.microsoft.com/office/drawing/2014/main" id="{89FAF077-0197-4539-8F6F-5EE1B652C00D}"/>
+              </a:ext>
+            </a:extLst>
+          </p:cNvPr>
+          <p:cNvPicPr>
+            <a:picLocks noChangeAspect="1" noChangeArrowheads="1"/>
+          </p:cNvPicPr>
+          <p:nvPr/>
+        </p:nvPicPr>
+        <p:blipFill rotWithShape="1">
+          <a:blip r:embed="rId2">
+            <a:extLst>
+              <a:ext uri="{28A0092B-C50C-407E-A947-70E740481C1C}">
+                <a14:useLocalDpi xmlns:a14="http://schemas.microsoft.com/office/drawing/2010/main" val="0"/>
+              </a:ext>
+            </a:extLst>
+          </a:blip>
+          <a:srcRect b="3846"/>
+          <a:stretch/>
+        </p:blipFill>
+        <p:spPr bwMode="auto">
+          <a:xfrm>
+            <a:off x="20" y="10"/>
+            <a:ext cx="12191980" cy="6857990"/>
+          </a:xfrm>
+          <a:prstGeom prst="rect">
+            <a:avLst/>
+          </a:prstGeom>
+          <a:noFill/>
+          <a:extLst>
+            <a:ext uri="{909E8E84-426E-40DD-AFC4-6F175D3DCCD1}">
+              <a14:hiddenFill xmlns:a14="http://schemas.microsoft.com/office/drawing/2010/main">
+                <a:solidFill>
+                  <a:srgbClr val="FFFFFF"/>
+                </a:solidFill>
+              </a14:hiddenFill>
+            </a:ext>
+          </a:extLst>
+        </p:spPr>
+      </p:pic>
+      <p:sp>
+        <p:nvSpPr>
+          <p:cNvPr id="40" name="Rectangle 39">
+            <a:extLst>
+              <a:ext uri="{FF2B5EF4-FFF2-40B4-BE49-F238E27FC236}">
+                <a16:creationId xmlns:a16="http://schemas.microsoft.com/office/drawing/2014/main" id="{DCF1FFC3-D020-43C3-8B93-EF6BEFC46DD6}"/>
+              </a:ext>
+              <a:ext uri="{C183D7F6-B498-43B3-948B-1728B52AA6E4}">
+                <adec:decorative xmlns:adec="http://schemas.microsoft.com/office/drawing/2017/decorative" val="1"/>
+              </a:ext>
+            </a:extLst>
+          </p:cNvPr>
+          <p:cNvSpPr>
+            <a:spLocks noGrp="1" noRot="1" noChangeAspect="1" noMove="1" noResize="1" noEditPoints="1" noAdjustHandles="1" noChangeArrowheads="1" noChangeShapeType="1" noTextEdit="1"/>
+          </p:cNvSpPr>
+          <p:nvPr>
+            <p:extLst>
+              <p:ext uri="{386F3935-93C4-4BCD-93E2-E3B085C9AB24}">
+                <p16:designElem xmlns:p16="http://schemas.microsoft.com/office/powerpoint/2015/main" val="1"/>
+              </p:ext>
+            </p:extLst>
+          </p:nvPr>
+        </p:nvSpPr>
+        <p:spPr bwMode="ltGray">
+          <a:xfrm>
+            <a:off x="1912620" y="1929384"/>
+            <a:ext cx="8366760" cy="2999232"/>
+          </a:xfrm>
+          <a:prstGeom prst="rect">
+            <a:avLst/>
+          </a:prstGeom>
+          <a:solidFill>
+            <a:schemeClr val="bg1">
+              <a:alpha val="89000"/>
+            </a:schemeClr>
+          </a:solidFill>
+          <a:ln w="127000" cap="sq" cmpd="thinThick">
+            <a:solidFill>
+              <a:schemeClr val="bg1"/>
+            </a:solidFill>
+          </a:ln>
+        </p:spPr>
+        <p:style>
+          <a:lnRef idx="2">
+            <a:schemeClr val="accent1">
+              <a:shade val="50000"/>
+            </a:schemeClr>
+          </a:lnRef>
+          <a:fillRef idx="1">
+            <a:schemeClr val="accent1"/>
+          </a:fillRef>
+          <a:effectRef idx="0">
+            <a:schemeClr val="accent1"/>
+          </a:effectRef>
+          <a:fontRef idx="minor">
+            <a:schemeClr val="lt1"/>
+          </a:fontRef>
+        </p:style>
+        <p:txBody>
+          <a:bodyPr rtlCol="0" anchor="ctr"/>
+          <a:lstStyle/>
+          <a:p>
+            <a:pPr algn="ctr"/>
+            <a:endParaRPr lang="en-US"/>
+          </a:p>
+        </p:txBody>
+      </p:sp>
       <p:sp>
         <p:nvSpPr>
           <p:cNvPr id="2" name="Title 1">
@@ -3347,46 +3466,80 @@
             <p:ph type="ctrTitle"/>
           </p:nvPr>
         </p:nvSpPr>
-        <p:spPr/>
-        <p:txBody>
-          <a:bodyPr/>
-          <a:lstStyle/>
-          <a:p>
-            <a:r>
-              <a:rPr lang="en-US" dirty="0"/>
-              <a:t>&lt;Your Name&gt;</a:t>
-            </a:r>
-          </a:p>
-        </p:txBody>
-      </p:sp>
-      <p:sp>
-        <p:nvSpPr>
-          <p:cNvPr id="5" name="Subtitle 4">
-            <a:extLst>
-              <a:ext uri="{FF2B5EF4-FFF2-40B4-BE49-F238E27FC236}">
-                <a16:creationId xmlns:a16="http://schemas.microsoft.com/office/drawing/2014/main" id="{DD03A184-9438-4330-A45B-89C3F5511DBD}"/>
-              </a:ext>
-            </a:extLst>
-          </p:cNvPr>
-          <p:cNvSpPr>
-            <a:spLocks noGrp="1"/>
-          </p:cNvSpPr>
-          <p:nvPr>
-            <p:ph type="subTitle" idx="1"/>
-          </p:nvPr>
-        </p:nvSpPr>
-        <p:spPr/>
-        <p:txBody>
-          <a:bodyPr/>
-          <a:lstStyle/>
-          <a:p>
-            <a:r>
-              <a:rPr lang="en-US" dirty="0"/>
-              <a:t>(Feel free to apply color &amp; style to your slides)</a:t>
-            </a:r>
-          </a:p>
-        </p:txBody>
-      </p:sp>
+        <p:spPr>
+          <a:xfrm>
+            <a:off x="2366010" y="2479606"/>
+            <a:ext cx="7459980" cy="1425924"/>
+          </a:xfrm>
+        </p:spPr>
+        <p:txBody>
+          <a:bodyPr>
+            <a:normAutofit/>
+          </a:bodyPr>
+          <a:lstStyle/>
+          <a:p>
+            <a:r>
+              <a:rPr lang="en-US" sz="5400" dirty="0">
+                <a:latin typeface="Times New Roman" panose="02020603050405020304" pitchFamily="18" charset="0"/>
+                <a:cs typeface="Times New Roman" panose="02020603050405020304" pitchFamily="18" charset="0"/>
+              </a:rPr>
+              <a:t>Jordon Bruton</a:t>
+            </a:r>
+          </a:p>
+        </p:txBody>
+      </p:sp>
+      <p:cxnSp>
+        <p:nvCxnSpPr>
+          <p:cNvPr id="42" name="Straight Connector 41">
+            <a:extLst>
+              <a:ext uri="{FF2B5EF4-FFF2-40B4-BE49-F238E27FC236}">
+                <a16:creationId xmlns:a16="http://schemas.microsoft.com/office/drawing/2014/main" id="{16FC4A39-71B0-433B-AB94-CBFFA0DF90DF}"/>
+              </a:ext>
+              <a:ext uri="{C183D7F6-B498-43B3-948B-1728B52AA6E4}">
+                <adec:decorative xmlns:adec="http://schemas.microsoft.com/office/drawing/2017/decorative" val="1"/>
+              </a:ext>
+            </a:extLst>
+          </p:cNvPr>
+          <p:cNvCxnSpPr>
+            <a:cxnSpLocks noGrp="1" noRot="1" noChangeAspect="1" noMove="1" noResize="1" noEditPoints="1" noAdjustHandles="1" noChangeArrowheads="1" noChangeShapeType="1"/>
+          </p:cNvCxnSpPr>
+          <p:nvPr>
+            <p:extLst>
+              <p:ext uri="{386F3935-93C4-4BCD-93E2-E3B085C9AB24}">
+                <p16:designElem xmlns:p16="http://schemas.microsoft.com/office/powerpoint/2015/main" val="1"/>
+              </p:ext>
+            </p:extLst>
+          </p:nvPr>
+        </p:nvCxnSpPr>
+        <p:spPr>
+          <a:xfrm>
+            <a:off x="4802605" y="3792064"/>
+            <a:ext cx="2586790" cy="0"/>
+          </a:xfrm>
+          <a:prstGeom prst="line">
+            <a:avLst/>
+          </a:prstGeom>
+          <a:ln w="22225">
+            <a:solidFill>
+              <a:srgbClr val="5E4166"/>
+            </a:solidFill>
+          </a:ln>
+        </p:spPr>
+        <p:style>
+          <a:lnRef idx="1">
+            <a:schemeClr val="accent1"/>
+          </a:lnRef>
+          <a:fillRef idx="0">
+            <a:schemeClr val="accent1"/>
+          </a:fillRef>
+          <a:effectRef idx="0">
+            <a:schemeClr val="accent1"/>
+          </a:effectRef>
+          <a:fontRef idx="minor">
+            <a:schemeClr val="tx1"/>
+          </a:fontRef>
+        </p:style>
+      </p:cxnSp>
     </p:spTree>
     <p:extLst>
       <p:ext uri="{BB962C8B-B14F-4D97-AF65-F5344CB8AC3E}">
@@ -3403,6 +3556,16 @@
 <file path=ppt/slides/slide2.xml><?xml version="1.0" encoding="utf-8"?>
 <p:sld xmlns:a="http://schemas.openxmlformats.org/drawingml/2006/main" xmlns:r="http://schemas.openxmlformats.org/officeDocument/2006/relationships" xmlns:p="http://schemas.openxmlformats.org/presentationml/2006/main">
   <p:cSld>
+    <p:bg>
+      <p:bgPr>
+        <a:solidFill>
+          <a:schemeClr val="accent1">
+            <a:lumMod val="50000"/>
+          </a:schemeClr>
+        </a:solidFill>
+        <a:effectLst/>
+      </p:bgPr>
+    </p:bg>
     <p:spTree>
       <p:nvGrpSpPr>
         <p:cNvPr id="1" name=""/>
@@ -3417,6 +3580,123 @@
           <a:chExt cx="0" cy="0"/>
         </a:xfrm>
       </p:grpSpPr>
+      <p:cxnSp>
+        <p:nvCxnSpPr>
+          <p:cNvPr id="43" name="Straight Connector 42">
+            <a:extLst>
+              <a:ext uri="{FF2B5EF4-FFF2-40B4-BE49-F238E27FC236}">
+                <a16:creationId xmlns:a16="http://schemas.microsoft.com/office/drawing/2014/main" id="{DB146403-F3D6-484B-B2ED-97F9565D0370}"/>
+              </a:ext>
+              <a:ext uri="{C183D7F6-B498-43B3-948B-1728B52AA6E4}">
+                <adec:decorative xmlns:adec="http://schemas.microsoft.com/office/drawing/2017/decorative" val="1"/>
+              </a:ext>
+            </a:extLst>
+          </p:cNvPr>
+          <p:cNvCxnSpPr>
+            <a:cxnSpLocks noGrp="1" noRot="1" noChangeAspect="1" noMove="1" noResize="1" noEditPoints="1" noAdjustHandles="1" noChangeArrowheads="1" noChangeShapeType="1"/>
+          </p:cNvCxnSpPr>
+          <p:nvPr>
+            <p:extLst>
+              <p:ext uri="{386F3935-93C4-4BCD-93E2-E3B085C9AB24}">
+                <p16:designElem xmlns:p16="http://schemas.microsoft.com/office/powerpoint/2015/main" val="1"/>
+              </p:ext>
+            </p:extLst>
+          </p:nvPr>
+        </p:nvCxnSpPr>
+        <p:spPr>
+          <a:xfrm>
+            <a:off x="6096000" y="477749"/>
+            <a:ext cx="0" cy="3657600"/>
+          </a:xfrm>
+          <a:prstGeom prst="line">
+            <a:avLst/>
+          </a:prstGeom>
+          <a:ln w="101600" cmpd="dbl">
+            <a:solidFill>
+              <a:srgbClr val="595959"/>
+            </a:solidFill>
+          </a:ln>
+        </p:spPr>
+        <p:style>
+          <a:lnRef idx="1">
+            <a:schemeClr val="accent1"/>
+          </a:lnRef>
+          <a:fillRef idx="0">
+            <a:schemeClr val="accent1"/>
+          </a:fillRef>
+          <a:effectRef idx="0">
+            <a:schemeClr val="accent1"/>
+          </a:effectRef>
+          <a:fontRef idx="minor">
+            <a:schemeClr val="tx1"/>
+          </a:fontRef>
+        </p:style>
+      </p:cxnSp>
+      <p:sp>
+        <p:nvSpPr>
+          <p:cNvPr id="45" name="Rectangle 44">
+            <a:extLst>
+              <a:ext uri="{FF2B5EF4-FFF2-40B4-BE49-F238E27FC236}">
+                <a16:creationId xmlns:a16="http://schemas.microsoft.com/office/drawing/2014/main" id="{823AC064-BC96-4F32-8AE1-B2FD38754823}"/>
+              </a:ext>
+              <a:ext uri="{C183D7F6-B498-43B3-948B-1728B52AA6E4}">
+                <adec:decorative xmlns:adec="http://schemas.microsoft.com/office/drawing/2017/decorative" val="1"/>
+              </a:ext>
+            </a:extLst>
+          </p:cNvPr>
+          <p:cNvSpPr>
+            <a:spLocks noGrp="1" noRot="1" noChangeAspect="1" noMove="1" noResize="1" noEditPoints="1" noAdjustHandles="1" noChangeArrowheads="1" noChangeShapeType="1" noTextEdit="1"/>
+          </p:cNvSpPr>
+          <p:nvPr>
+            <p:extLst>
+              <p:ext uri="{386F3935-93C4-4BCD-93E2-E3B085C9AB24}">
+                <p16:designElem xmlns:p16="http://schemas.microsoft.com/office/powerpoint/2015/main" val="1"/>
+              </p:ext>
+            </p:extLst>
+          </p:nvPr>
+        </p:nvSpPr>
+        <p:spPr bwMode="ltGray">
+          <a:xfrm>
+            <a:off x="378068" y="4633546"/>
+            <a:ext cx="11438793" cy="1844256"/>
+          </a:xfrm>
+          <a:prstGeom prst="rect">
+            <a:avLst/>
+          </a:prstGeom>
+          <a:solidFill>
+            <a:srgbClr val="404040"/>
+          </a:solidFill>
+          <a:ln w="127000" cap="sq" cmpd="thinThick">
+            <a:solidFill>
+              <a:srgbClr val="404040"/>
+            </a:solidFill>
+          </a:ln>
+        </p:spPr>
+        <p:style>
+          <a:lnRef idx="2">
+            <a:schemeClr val="accent1">
+              <a:shade val="50000"/>
+            </a:schemeClr>
+          </a:lnRef>
+          <a:fillRef idx="1">
+            <a:schemeClr val="accent1"/>
+          </a:fillRef>
+          <a:effectRef idx="0">
+            <a:schemeClr val="accent1"/>
+          </a:effectRef>
+          <a:fontRef idx="minor">
+            <a:schemeClr val="lt1"/>
+          </a:fontRef>
+        </p:style>
+        <p:txBody>
+          <a:bodyPr rtlCol="0" anchor="ctr"/>
+          <a:lstStyle/>
+          <a:p>
+            <a:pPr algn="ctr"/>
+            <a:endParaRPr lang="en-US"/>
+          </a:p>
+        </p:txBody>
+      </p:sp>
       <p:sp>
         <p:nvSpPr>
           <p:cNvPr id="2" name="Title 1">
@@ -3433,46 +3713,174 @@
             <p:ph type="title"/>
           </p:nvPr>
         </p:nvSpPr>
-        <p:spPr/>
-        <p:txBody>
-          <a:bodyPr/>
-          <a:lstStyle/>
-          <a:p>
-            <a:r>
-              <a:rPr lang="en-US" dirty="0"/>
-              <a:t>Replace this slide with the coolest thing about your program.</a:t>
-            </a:r>
-          </a:p>
-        </p:txBody>
-      </p:sp>
-      <p:sp>
-        <p:nvSpPr>
-          <p:cNvPr id="3" name="Content Placeholder 2">
-            <a:extLst>
-              <a:ext uri="{FF2B5EF4-FFF2-40B4-BE49-F238E27FC236}">
-                <a16:creationId xmlns:a16="http://schemas.microsoft.com/office/drawing/2014/main" id="{7EA27E2C-D665-4032-A65A-ECB7BF1FC9D4}"/>
-              </a:ext>
-            </a:extLst>
-          </p:cNvPr>
-          <p:cNvSpPr>
-            <a:spLocks noGrp="1"/>
-          </p:cNvSpPr>
+        <p:spPr>
+          <a:xfrm>
+            <a:off x="791017" y="5244373"/>
+            <a:ext cx="11139854" cy="930447"/>
+          </a:xfrm>
+        </p:spPr>
+        <p:txBody>
+          <a:bodyPr vert="horz" lIns="91440" tIns="45720" rIns="91440" bIns="45720" rtlCol="0" anchor="b">
+            <a:noAutofit/>
+          </a:bodyPr>
+          <a:lstStyle/>
+          <a:p>
+            <a:r>
+              <a:rPr lang="en-US" sz="2500" dirty="0">
+                <a:solidFill>
+                  <a:srgbClr val="FFFFFF"/>
+                </a:solidFill>
+                <a:latin typeface="Times New Roman" panose="02020603050405020304" pitchFamily="18" charset="0"/>
+                <a:cs typeface="Times New Roman" panose="02020603050405020304" pitchFamily="18" charset="0"/>
+              </a:rPr>
+              <a:t>Function parameters:</a:t>
+            </a:r>
+            <a:br>
+              <a:rPr lang="en-US" sz="2500" dirty="0">
+                <a:solidFill>
+                  <a:srgbClr val="FFFFFF"/>
+                </a:solidFill>
+                <a:latin typeface="Times New Roman" panose="02020603050405020304" pitchFamily="18" charset="0"/>
+                <a:cs typeface="Times New Roman" panose="02020603050405020304" pitchFamily="18" charset="0"/>
+              </a:rPr>
+            </a:br>
+            <a:r>
+              <a:rPr lang="en-US" sz="2500" dirty="0">
+                <a:solidFill>
+                  <a:srgbClr val="FFFFFF"/>
+                </a:solidFill>
+                <a:latin typeface="Times New Roman" panose="02020603050405020304" pitchFamily="18" charset="0"/>
+                <a:cs typeface="Times New Roman" panose="02020603050405020304" pitchFamily="18" charset="0"/>
+              </a:rPr>
+              <a:t>- Used function parameters to not only keep track of how much the user spent, but also the parts that they decided on </a:t>
+            </a:r>
+          </a:p>
+        </p:txBody>
+      </p:sp>
+      <p:pic>
+        <p:nvPicPr>
+          <p:cNvPr id="7" name="Picture 6" descr="A screen shot of a computer&#10;&#10;Description automatically generated">
+            <a:extLst>
+              <a:ext uri="{FF2B5EF4-FFF2-40B4-BE49-F238E27FC236}">
+                <a16:creationId xmlns:a16="http://schemas.microsoft.com/office/drawing/2014/main" id="{AD29EF8A-C9D4-4AE0-9165-C05552893593}"/>
+              </a:ext>
+            </a:extLst>
+          </p:cNvPr>
+          <p:cNvPicPr>
+            <a:picLocks noChangeAspect="1"/>
+          </p:cNvPicPr>
+          <p:nvPr/>
+        </p:nvPicPr>
+        <p:blipFill rotWithShape="1">
+          <a:blip r:embed="rId2">
+            <a:extLst>
+              <a:ext uri="{28A0092B-C50C-407E-A947-70E740481C1C}">
+                <a14:useLocalDpi xmlns:a14="http://schemas.microsoft.com/office/drawing/2010/main" val="0"/>
+              </a:ext>
+            </a:extLst>
+          </a:blip>
+          <a:srcRect t="10118" r="3" b="13223"/>
+          <a:stretch/>
+        </p:blipFill>
+        <p:spPr>
+          <a:xfrm>
+            <a:off x="308115" y="1613627"/>
+            <a:ext cx="5455917" cy="1385844"/>
+          </a:xfrm>
+          <a:prstGeom prst="rect">
+            <a:avLst/>
+          </a:prstGeom>
+        </p:spPr>
+      </p:pic>
+      <p:pic>
+        <p:nvPicPr>
+          <p:cNvPr id="5" name="Content Placeholder 4" descr="A picture containing sitting, holding&#10;&#10;Description automatically generated">
+            <a:extLst>
+              <a:ext uri="{FF2B5EF4-FFF2-40B4-BE49-F238E27FC236}">
+                <a16:creationId xmlns:a16="http://schemas.microsoft.com/office/drawing/2014/main" id="{8E884502-3B67-468B-B2ED-5193821B57DB}"/>
+              </a:ext>
+            </a:extLst>
+          </p:cNvPr>
+          <p:cNvPicPr>
+            <a:picLocks noGrp="1" noChangeAspect="1"/>
+          </p:cNvPicPr>
           <p:nvPr>
             <p:ph idx="1"/>
           </p:nvPr>
-        </p:nvSpPr>
-        <p:spPr/>
-        <p:txBody>
-          <a:bodyPr/>
-          <a:lstStyle/>
-          <a:p>
-            <a:r>
-              <a:rPr lang="en-US" dirty="0"/>
-              <a:t>You will introduce your program by talking about the coolest part / thing you’re most proud of</a:t>
-            </a:r>
-          </a:p>
-        </p:txBody>
-      </p:sp>
+        </p:nvPicPr>
+        <p:blipFill rotWithShape="1">
+          <a:blip r:embed="rId3">
+            <a:extLst>
+              <a:ext uri="{28A0092B-C50C-407E-A947-70E740481C1C}">
+                <a14:useLocalDpi xmlns:a14="http://schemas.microsoft.com/office/drawing/2010/main" val="0"/>
+              </a:ext>
+            </a:extLst>
+          </a:blip>
+          <a:srcRect r="1" b="1232"/>
+          <a:stretch/>
+        </p:blipFill>
+        <p:spPr>
+          <a:xfrm>
+            <a:off x="6360944" y="1544124"/>
+            <a:ext cx="5455917" cy="1360659"/>
+          </a:xfrm>
+          <a:prstGeom prst="rect">
+            <a:avLst/>
+          </a:prstGeom>
+        </p:spPr>
+      </p:pic>
+      <p:cxnSp>
+        <p:nvCxnSpPr>
+          <p:cNvPr id="47" name="Straight Connector 46">
+            <a:extLst>
+              <a:ext uri="{FF2B5EF4-FFF2-40B4-BE49-F238E27FC236}">
+                <a16:creationId xmlns:a16="http://schemas.microsoft.com/office/drawing/2014/main" id="{7E7C77BC-7138-40B1-A15B-20F57A494629}"/>
+              </a:ext>
+              <a:ext uri="{C183D7F6-B498-43B3-948B-1728B52AA6E4}">
+                <adec:decorative xmlns:adec="http://schemas.microsoft.com/office/drawing/2017/decorative" val="1"/>
+              </a:ext>
+            </a:extLst>
+          </p:cNvPr>
+          <p:cNvCxnSpPr>
+            <a:cxnSpLocks noGrp="1" noRot="1" noChangeAspect="1" noMove="1" noResize="1" noEditPoints="1" noAdjustHandles="1" noChangeArrowheads="1" noChangeShapeType="1"/>
+          </p:cNvCxnSpPr>
+          <p:nvPr>
+            <p:extLst>
+              <p:ext uri="{386F3935-93C4-4BCD-93E2-E3B085C9AB24}">
+                <p16:designElem xmlns:p16="http://schemas.microsoft.com/office/powerpoint/2015/main" val="1"/>
+              </p:ext>
+            </p:extLst>
+          </p:nvPr>
+        </p:nvCxnSpPr>
+        <p:spPr>
+          <a:xfrm>
+            <a:off x="2209800" y="5738691"/>
+            <a:ext cx="7772400" cy="0"/>
+          </a:xfrm>
+          <a:prstGeom prst="line">
+            <a:avLst/>
+          </a:prstGeom>
+          <a:ln w="22225">
+            <a:solidFill>
+              <a:srgbClr val="D9D9D9"/>
+            </a:solidFill>
+          </a:ln>
+        </p:spPr>
+        <p:style>
+          <a:lnRef idx="1">
+            <a:schemeClr val="accent1"/>
+          </a:lnRef>
+          <a:fillRef idx="0">
+            <a:schemeClr val="accent1"/>
+          </a:fillRef>
+          <a:effectRef idx="0">
+            <a:schemeClr val="accent1"/>
+          </a:effectRef>
+          <a:fontRef idx="minor">
+            <a:schemeClr val="tx1"/>
+          </a:fontRef>
+        </p:style>
+      </p:cxnSp>
     </p:spTree>
     <p:extLst>
       <p:ext uri="{BB962C8B-B14F-4D97-AF65-F5344CB8AC3E}">
@@ -3489,6 +3897,16 @@
 <file path=ppt/slides/slide3.xml><?xml version="1.0" encoding="utf-8"?>
 <p:sld xmlns:a="http://schemas.openxmlformats.org/drawingml/2006/main" xmlns:r="http://schemas.openxmlformats.org/officeDocument/2006/relationships" xmlns:p="http://schemas.openxmlformats.org/presentationml/2006/main">
   <p:cSld>
+    <p:bg>
+      <p:bgPr>
+        <a:solidFill>
+          <a:schemeClr val="accent1">
+            <a:lumMod val="50000"/>
+          </a:schemeClr>
+        </a:solidFill>
+        <a:effectLst/>
+      </p:bgPr>
+    </p:bg>
     <p:spTree>
       <p:nvGrpSpPr>
         <p:cNvPr id="1" name=""/>
@@ -3516,55 +3934,76 @@
             <a:spLocks noGrp="1"/>
           </p:cNvSpPr>
           <p:nvPr>
-            <p:ph type="title"/>
-          </p:nvPr>
-        </p:nvSpPr>
-        <p:spPr/>
-        <p:txBody>
-          <a:bodyPr/>
-          <a:lstStyle/>
-          <a:p>
-            <a:r>
-              <a:rPr lang="en-US" dirty="0"/>
-              <a:t>Replace this slide with the code that you’re the most proud of </a:t>
-            </a:r>
-          </a:p>
-        </p:txBody>
-      </p:sp>
-      <p:sp>
-        <p:nvSpPr>
-          <p:cNvPr id="3" name="Content Placeholder 2">
-            <a:extLst>
-              <a:ext uri="{FF2B5EF4-FFF2-40B4-BE49-F238E27FC236}">
-                <a16:creationId xmlns:a16="http://schemas.microsoft.com/office/drawing/2014/main" id="{5CAB9C68-D348-4731-B1B4-EE60AB54550B}"/>
-              </a:ext>
-            </a:extLst>
-          </p:cNvPr>
-          <p:cNvSpPr>
-            <a:spLocks noGrp="1"/>
-          </p:cNvSpPr>
-          <p:nvPr>
-            <p:ph idx="1"/>
-          </p:nvPr>
-        </p:nvSpPr>
-        <p:spPr/>
-        <p:txBody>
-          <a:bodyPr/>
-          <a:lstStyle/>
-          <a:p>
-            <a:r>
-              <a:rPr lang="en-US" dirty="0"/>
-              <a:t>You will next talk about the code in your program that you’re the most proud of.</a:t>
-            </a:r>
-          </a:p>
-          <a:p>
-            <a:r>
-              <a:rPr lang="en-US" dirty="0"/>
-              <a:t>Alternatively, you can present a structural system diagram if that’s more to your liking</a:t>
-            </a:r>
-          </a:p>
-        </p:txBody>
-      </p:sp>
+            <p:ph type="title" idx="4294967295"/>
+          </p:nvPr>
+        </p:nvSpPr>
+        <p:spPr>
+          <a:xfrm>
+            <a:off x="9048750" y="484188"/>
+            <a:ext cx="3143250" cy="5622925"/>
+          </a:xfrm>
+        </p:spPr>
+        <p:txBody>
+          <a:bodyPr vert="horz" lIns="91440" tIns="45720" rIns="91440" bIns="45720" rtlCol="0" anchor="ctr">
+            <a:normAutofit/>
+          </a:bodyPr>
+          <a:lstStyle/>
+          <a:p>
+            <a:pPr marL="457200" indent="-457200">
+              <a:buFont typeface="Arial" panose="020B0604020202020204" pitchFamily="34" charset="0"/>
+              <a:buChar char="•"/>
+            </a:pPr>
+            <a:r>
+              <a:rPr lang="en-US" sz="2500" dirty="0">
+                <a:solidFill>
+                  <a:srgbClr val="FFFFFF"/>
+                </a:solidFill>
+                <a:latin typeface="Times New Roman" panose="02020603050405020304" pitchFamily="18" charset="0"/>
+                <a:cs typeface="Times New Roman" panose="02020603050405020304" pitchFamily="18" charset="0"/>
+              </a:rPr>
+              <a:t>Using two different data structures in order to keep track of the desired parts of a PC in the simplest of ways</a:t>
+            </a:r>
+          </a:p>
+        </p:txBody>
+      </p:sp>
+      <p:pic>
+        <p:nvPicPr>
+          <p:cNvPr id="5" name="Content Placeholder 4" descr="A screen shot of a smart phone&#10;&#10;Description automatically generated">
+            <a:extLst>
+              <a:ext uri="{FF2B5EF4-FFF2-40B4-BE49-F238E27FC236}">
+                <a16:creationId xmlns:a16="http://schemas.microsoft.com/office/drawing/2014/main" id="{5DAE4A2E-8634-47D1-8A13-54230345AD8E}"/>
+              </a:ext>
+            </a:extLst>
+          </p:cNvPr>
+          <p:cNvPicPr>
+            <a:picLocks noGrp="1" noChangeAspect="1"/>
+          </p:cNvPicPr>
+          <p:nvPr>
+            <p:ph idx="4294967295"/>
+          </p:nvPr>
+        </p:nvPicPr>
+        <p:blipFill rotWithShape="1">
+          <a:blip r:embed="rId2">
+            <a:extLst>
+              <a:ext uri="{28A0092B-C50C-407E-A947-70E740481C1C}">
+                <a14:useLocalDpi xmlns:a14="http://schemas.microsoft.com/office/drawing/2010/main" val="0"/>
+              </a:ext>
+            </a:extLst>
+          </a:blip>
+          <a:srcRect r="22906" b="1"/>
+          <a:stretch/>
+        </p:blipFill>
+        <p:spPr>
+          <a:xfrm>
+            <a:off x="1061489" y="1024731"/>
+            <a:ext cx="7162800" cy="4808538"/>
+          </a:xfrm>
+          <a:prstGeom prst="rect">
+            <a:avLst/>
+          </a:prstGeom>
+          <a:effectLst/>
+        </p:spPr>
+      </p:pic>
     </p:spTree>
     <p:extLst>
       <p:ext uri="{BB962C8B-B14F-4D97-AF65-F5344CB8AC3E}">
@@ -3581,6 +4020,14 @@
 <file path=ppt/slides/slide4.xml><?xml version="1.0" encoding="utf-8"?>
 <p:sld xmlns:a="http://schemas.openxmlformats.org/drawingml/2006/main" xmlns:r="http://schemas.openxmlformats.org/officeDocument/2006/relationships" xmlns:p="http://schemas.openxmlformats.org/presentationml/2006/main">
   <p:cSld>
+    <p:bg>
+      <p:bgPr>
+        <a:solidFill>
+          <a:schemeClr val="bg1"/>
+        </a:solidFill>
+        <a:effectLst/>
+      </p:bgPr>
+    </p:bg>
     <p:spTree>
       <p:nvGrpSpPr>
         <p:cNvPr id="1" name=""/>
@@ -3595,6 +4042,385 @@
           <a:chExt cx="0" cy="0"/>
         </a:xfrm>
       </p:grpSpPr>
+      <p:pic>
+        <p:nvPicPr>
+          <p:cNvPr id="2050" name="Picture 2" descr="Computer Science Fundamentals | edX">
+            <a:extLst>
+              <a:ext uri="{FF2B5EF4-FFF2-40B4-BE49-F238E27FC236}">
+                <a16:creationId xmlns:a16="http://schemas.microsoft.com/office/drawing/2014/main" id="{FD95FFF6-C708-4838-8A34-D981809AE6A9}"/>
+              </a:ext>
+            </a:extLst>
+          </p:cNvPr>
+          <p:cNvPicPr>
+            <a:picLocks noChangeAspect="1" noChangeArrowheads="1"/>
+          </p:cNvPicPr>
+          <p:nvPr/>
+        </p:nvPicPr>
+        <p:blipFill rotWithShape="1">
+          <a:blip r:embed="rId2">
+            <a:extLst>
+              <a:ext uri="{28A0092B-C50C-407E-A947-70E740481C1C}">
+                <a14:useLocalDpi xmlns:a14="http://schemas.microsoft.com/office/drawing/2010/main" val="0"/>
+              </a:ext>
+            </a:extLst>
+          </a:blip>
+          <a:srcRect t="4084" r="9496" b="5008"/>
+          <a:stretch/>
+        </p:blipFill>
+        <p:spPr bwMode="auto">
+          <a:xfrm>
+            <a:off x="-1" y="0"/>
+            <a:ext cx="12192001" cy="6858000"/>
+          </a:xfrm>
+          <a:prstGeom prst="rect">
+            <a:avLst/>
+          </a:prstGeom>
+          <a:noFill/>
+          <a:extLst>
+            <a:ext uri="{909E8E84-426E-40DD-AFC4-6F175D3DCCD1}">
+              <a14:hiddenFill xmlns:a14="http://schemas.microsoft.com/office/drawing/2010/main">
+                <a:solidFill>
+                  <a:srgbClr val="FFFFFF"/>
+                </a:solidFill>
+              </a14:hiddenFill>
+            </a:ext>
+          </a:extLst>
+        </p:spPr>
+      </p:pic>
+      <p:sp>
+        <p:nvSpPr>
+          <p:cNvPr id="139" name="Freeform: Shape 138">
+            <a:extLst>
+              <a:ext uri="{FF2B5EF4-FFF2-40B4-BE49-F238E27FC236}">
+                <a16:creationId xmlns:a16="http://schemas.microsoft.com/office/drawing/2014/main" id="{E862BE82-D00D-42C1-BF16-93AA37870C32}"/>
+              </a:ext>
+              <a:ext uri="{C183D7F6-B498-43B3-948B-1728B52AA6E4}">
+                <adec:decorative xmlns:adec="http://schemas.microsoft.com/office/drawing/2017/decorative" val="1"/>
+              </a:ext>
+            </a:extLst>
+          </p:cNvPr>
+          <p:cNvSpPr>
+            <a:spLocks noGrp="1" noRot="1" noChangeAspect="1" noMove="1" noResize="1" noEditPoints="1" noAdjustHandles="1" noChangeArrowheads="1" noChangeShapeType="1" noTextEdit="1"/>
+          </p:cNvSpPr>
+          <p:nvPr>
+            <p:extLst>
+              <p:ext uri="{386F3935-93C4-4BCD-93E2-E3B085C9AB24}">
+                <p16:designElem xmlns:p16="http://schemas.microsoft.com/office/powerpoint/2015/main" val="1"/>
+              </p:ext>
+            </p:extLst>
+          </p:nvPr>
+        </p:nvSpPr>
+        <p:spPr>
+          <a:xfrm>
+            <a:off x="0" y="-2008"/>
+            <a:ext cx="5609220" cy="5840278"/>
+          </a:xfrm>
+          <a:custGeom>
+            <a:avLst/>
+            <a:gdLst>
+              <a:gd name="connsiteX0" fmla="*/ 0 w 5609220"/>
+              <a:gd name="connsiteY0" fmla="*/ 0 h 5840278"/>
+              <a:gd name="connsiteX1" fmla="*/ 4637091 w 5609220"/>
+              <a:gd name="connsiteY1" fmla="*/ 0 h 5840278"/>
+              <a:gd name="connsiteX2" fmla="*/ 4822569 w 5609220"/>
+              <a:gd name="connsiteY2" fmla="*/ 204077 h 5840278"/>
+              <a:gd name="connsiteX3" fmla="*/ 5609220 w 5609220"/>
+              <a:gd name="connsiteY3" fmla="*/ 2395363 h 5840278"/>
+              <a:gd name="connsiteX4" fmla="*/ 2164305 w 5609220"/>
+              <a:gd name="connsiteY4" fmla="*/ 5840278 h 5840278"/>
+              <a:gd name="connsiteX5" fmla="*/ 238220 w 5609220"/>
+              <a:gd name="connsiteY5" fmla="*/ 5251941 h 5840278"/>
+              <a:gd name="connsiteX6" fmla="*/ 0 w 5609220"/>
+              <a:gd name="connsiteY6" fmla="*/ 5073803 h 5840278"/>
+            </a:gdLst>
+            <a:ahLst/>
+            <a:cxnLst>
+              <a:cxn ang="0">
+                <a:pos x="connsiteX0" y="connsiteY0"/>
+              </a:cxn>
+              <a:cxn ang="0">
+                <a:pos x="connsiteX1" y="connsiteY1"/>
+              </a:cxn>
+              <a:cxn ang="0">
+                <a:pos x="connsiteX2" y="connsiteY2"/>
+              </a:cxn>
+              <a:cxn ang="0">
+                <a:pos x="connsiteX3" y="connsiteY3"/>
+              </a:cxn>
+              <a:cxn ang="0">
+                <a:pos x="connsiteX4" y="connsiteY4"/>
+              </a:cxn>
+              <a:cxn ang="0">
+                <a:pos x="connsiteX5" y="connsiteY5"/>
+              </a:cxn>
+              <a:cxn ang="0">
+                <a:pos x="connsiteX6" y="connsiteY6"/>
+              </a:cxn>
+            </a:cxnLst>
+            <a:rect l="l" t="t" r="r" b="b"/>
+            <a:pathLst>
+              <a:path w="5609220" h="5840278">
+                <a:moveTo>
+                  <a:pt x="0" y="0"/>
+                </a:moveTo>
+                <a:lnTo>
+                  <a:pt x="4637091" y="0"/>
+                </a:lnTo>
+                <a:lnTo>
+                  <a:pt x="4822569" y="204077"/>
+                </a:lnTo>
+                <a:cubicBezTo>
+                  <a:pt x="5314007" y="799562"/>
+                  <a:pt x="5609220" y="1562987"/>
+                  <a:pt x="5609220" y="2395363"/>
+                </a:cubicBezTo>
+                <a:cubicBezTo>
+                  <a:pt x="5609220" y="4297937"/>
+                  <a:pt x="4066879" y="5840278"/>
+                  <a:pt x="2164305" y="5840278"/>
+                </a:cubicBezTo>
+                <a:cubicBezTo>
+                  <a:pt x="1450840" y="5840278"/>
+                  <a:pt x="788032" y="5623387"/>
+                  <a:pt x="238220" y="5251941"/>
+                </a:cubicBezTo>
+                <a:lnTo>
+                  <a:pt x="0" y="5073803"/>
+                </a:lnTo>
+                <a:close/>
+              </a:path>
+            </a:pathLst>
+          </a:custGeom>
+          <a:solidFill>
+            <a:schemeClr val="bg1">
+              <a:alpha val="50000"/>
+            </a:schemeClr>
+          </a:solidFill>
+          <a:ln>
+            <a:noFill/>
+          </a:ln>
+        </p:spPr>
+        <p:style>
+          <a:lnRef idx="2">
+            <a:schemeClr val="accent1">
+              <a:shade val="50000"/>
+            </a:schemeClr>
+          </a:lnRef>
+          <a:fillRef idx="1">
+            <a:schemeClr val="accent1"/>
+          </a:fillRef>
+          <a:effectRef idx="0">
+            <a:schemeClr val="accent1"/>
+          </a:effectRef>
+          <a:fontRef idx="minor">
+            <a:schemeClr val="lt1"/>
+          </a:fontRef>
+        </p:style>
+        <p:txBody>
+          <a:bodyPr rtlCol="0" anchor="ctr"/>
+          <a:lstStyle/>
+          <a:p>
+            <a:pPr marL="0" marR="0" lvl="0" indent="0" algn="ctr" defTabSz="914400" rtl="0" eaLnBrk="1" fontAlgn="auto" latinLnBrk="0" hangingPunct="1">
+              <a:lnSpc>
+                <a:spcPct val="100000"/>
+              </a:lnSpc>
+              <a:spcBef>
+                <a:spcPts val="0"/>
+              </a:spcBef>
+              <a:spcAft>
+                <a:spcPts val="0"/>
+              </a:spcAft>
+              <a:buClrTx/>
+              <a:buSzTx/>
+              <a:buFontTx/>
+              <a:buNone/>
+              <a:tabLst/>
+              <a:defRPr/>
+            </a:pPr>
+            <a:endParaRPr kumimoji="0" lang="en-US" sz="1800" b="0" i="0" u="none" strike="noStrike" kern="1200" cap="none" spc="0" normalizeH="0" baseline="0" noProof="0">
+              <a:ln>
+                <a:noFill/>
+              </a:ln>
+              <a:solidFill>
+                <a:prstClr val="white"/>
+              </a:solidFill>
+              <a:effectLst/>
+              <a:uLnTx/>
+              <a:uFillTx/>
+              <a:latin typeface="Calibri" panose="020F0502020204030204"/>
+              <a:ea typeface="+mn-ea"/>
+              <a:cs typeface="+mn-cs"/>
+            </a:endParaRPr>
+          </a:p>
+        </p:txBody>
+      </p:sp>
+      <p:sp>
+        <p:nvSpPr>
+          <p:cNvPr id="141" name="Freeform: Shape 140">
+            <a:extLst>
+              <a:ext uri="{FF2B5EF4-FFF2-40B4-BE49-F238E27FC236}">
+                <a16:creationId xmlns:a16="http://schemas.microsoft.com/office/drawing/2014/main" id="{F6D92C2D-1D3D-4974-918C-06579FB354A9}"/>
+              </a:ext>
+              <a:ext uri="{C183D7F6-B498-43B3-948B-1728B52AA6E4}">
+                <adec:decorative xmlns:adec="http://schemas.microsoft.com/office/drawing/2017/decorative" val="1"/>
+              </a:ext>
+            </a:extLst>
+          </p:cNvPr>
+          <p:cNvSpPr>
+            <a:spLocks noGrp="1" noRot="1" noChangeAspect="1" noMove="1" noResize="1" noEditPoints="1" noAdjustHandles="1" noChangeArrowheads="1" noChangeShapeType="1" noTextEdit="1"/>
+          </p:cNvSpPr>
+          <p:nvPr>
+            <p:extLst>
+              <p:ext uri="{386F3935-93C4-4BCD-93E2-E3B085C9AB24}">
+                <p16:designElem xmlns:p16="http://schemas.microsoft.com/office/powerpoint/2015/main" val="1"/>
+              </p:ext>
+            </p:extLst>
+          </p:nvPr>
+        </p:nvSpPr>
+        <p:spPr>
+          <a:xfrm>
+            <a:off x="-2333" y="-2"/>
+            <a:ext cx="5441859" cy="5654940"/>
+          </a:xfrm>
+          <a:custGeom>
+            <a:avLst/>
+            <a:gdLst>
+              <a:gd name="connsiteX0" fmla="*/ 0 w 5441859"/>
+              <a:gd name="connsiteY0" fmla="*/ 0 h 5654940"/>
+              <a:gd name="connsiteX1" fmla="*/ 4400492 w 5441859"/>
+              <a:gd name="connsiteY1" fmla="*/ 0 h 5654940"/>
+              <a:gd name="connsiteX2" fmla="*/ 4484767 w 5441859"/>
+              <a:gd name="connsiteY2" fmla="*/ 76595 h 5654940"/>
+              <a:gd name="connsiteX3" fmla="*/ 5441859 w 5441859"/>
+              <a:gd name="connsiteY3" fmla="*/ 2387221 h 5654940"/>
+              <a:gd name="connsiteX4" fmla="*/ 2174140 w 5441859"/>
+              <a:gd name="connsiteY4" fmla="*/ 5654940 h 5654940"/>
+              <a:gd name="connsiteX5" fmla="*/ 156693 w 5441859"/>
+              <a:gd name="connsiteY5" fmla="*/ 4957981 h 5654940"/>
+              <a:gd name="connsiteX6" fmla="*/ 0 w 5441859"/>
+              <a:gd name="connsiteY6" fmla="*/ 4820612 h 5654940"/>
+            </a:gdLst>
+            <a:ahLst/>
+            <a:cxnLst>
+              <a:cxn ang="0">
+                <a:pos x="connsiteX0" y="connsiteY0"/>
+              </a:cxn>
+              <a:cxn ang="0">
+                <a:pos x="connsiteX1" y="connsiteY1"/>
+              </a:cxn>
+              <a:cxn ang="0">
+                <a:pos x="connsiteX2" y="connsiteY2"/>
+              </a:cxn>
+              <a:cxn ang="0">
+                <a:pos x="connsiteX3" y="connsiteY3"/>
+              </a:cxn>
+              <a:cxn ang="0">
+                <a:pos x="connsiteX4" y="connsiteY4"/>
+              </a:cxn>
+              <a:cxn ang="0">
+                <a:pos x="connsiteX5" y="connsiteY5"/>
+              </a:cxn>
+              <a:cxn ang="0">
+                <a:pos x="connsiteX6" y="connsiteY6"/>
+              </a:cxn>
+            </a:cxnLst>
+            <a:rect l="l" t="t" r="r" b="b"/>
+            <a:pathLst>
+              <a:path w="5441859" h="5654940">
+                <a:moveTo>
+                  <a:pt x="0" y="0"/>
+                </a:moveTo>
+                <a:lnTo>
+                  <a:pt x="4400492" y="0"/>
+                </a:lnTo>
+                <a:lnTo>
+                  <a:pt x="4484767" y="76595"/>
+                </a:lnTo>
+                <a:cubicBezTo>
+                  <a:pt x="5076108" y="667936"/>
+                  <a:pt x="5441859" y="1484866"/>
+                  <a:pt x="5441859" y="2387221"/>
+                </a:cubicBezTo>
+                <a:cubicBezTo>
+                  <a:pt x="5441859" y="4191932"/>
+                  <a:pt x="3978851" y="5654940"/>
+                  <a:pt x="2174140" y="5654940"/>
+                </a:cubicBezTo>
+                <a:cubicBezTo>
+                  <a:pt x="1412778" y="5654940"/>
+                  <a:pt x="712231" y="5394557"/>
+                  <a:pt x="156693" y="4957981"/>
+                </a:cubicBezTo>
+                <a:lnTo>
+                  <a:pt x="0" y="4820612"/>
+                </a:lnTo>
+                <a:close/>
+              </a:path>
+            </a:pathLst>
+          </a:custGeom>
+          <a:solidFill>
+            <a:schemeClr val="bg1">
+              <a:alpha val="75000"/>
+            </a:schemeClr>
+          </a:solidFill>
+          <a:ln>
+            <a:noFill/>
+          </a:ln>
+        </p:spPr>
+        <p:style>
+          <a:lnRef idx="2">
+            <a:schemeClr val="accent1">
+              <a:shade val="50000"/>
+            </a:schemeClr>
+          </a:lnRef>
+          <a:fillRef idx="1">
+            <a:schemeClr val="accent1"/>
+          </a:fillRef>
+          <a:effectRef idx="0">
+            <a:schemeClr val="accent1"/>
+          </a:effectRef>
+          <a:fontRef idx="minor">
+            <a:schemeClr val="lt1"/>
+          </a:fontRef>
+        </p:style>
+        <p:txBody>
+          <a:bodyPr rtlCol="0" anchor="ctr"/>
+          <a:lstStyle/>
+          <a:p>
+            <a:pPr marL="0" marR="0" lvl="0" indent="0" algn="ctr" defTabSz="914400" rtl="0" eaLnBrk="1" fontAlgn="auto" latinLnBrk="0" hangingPunct="1">
+              <a:lnSpc>
+                <a:spcPct val="100000"/>
+              </a:lnSpc>
+              <a:spcBef>
+                <a:spcPts val="0"/>
+              </a:spcBef>
+              <a:spcAft>
+                <a:spcPts val="0"/>
+              </a:spcAft>
+              <a:buClrTx/>
+              <a:buSzTx/>
+              <a:buFontTx/>
+              <a:buNone/>
+              <a:tabLst/>
+              <a:defRPr/>
+            </a:pPr>
+            <a:endParaRPr kumimoji="0" lang="en-US" sz="1800" b="0" i="0" u="none" strike="noStrike" kern="1200" cap="none" spc="0" normalizeH="0" baseline="0" noProof="0" dirty="0">
+              <a:ln>
+                <a:noFill/>
+              </a:ln>
+              <a:solidFill>
+                <a:prstClr val="white"/>
+              </a:solidFill>
+              <a:effectLst/>
+              <a:uLnTx/>
+              <a:uFillTx/>
+              <a:latin typeface="Calibri" panose="020F0502020204030204"/>
+              <a:ea typeface="+mn-ea"/>
+              <a:cs typeface="+mn-cs"/>
+            </a:endParaRPr>
+          </a:p>
+        </p:txBody>
+      </p:sp>
       <p:sp>
         <p:nvSpPr>
           <p:cNvPr id="2" name="Title 1">
@@ -3611,13 +4437,23 @@
             <p:ph type="title"/>
           </p:nvPr>
         </p:nvSpPr>
-        <p:spPr/>
-        <p:txBody>
-          <a:bodyPr/>
-          <a:lstStyle/>
-          <a:p>
-            <a:r>
-              <a:rPr lang="en-US" dirty="0"/>
+        <p:spPr>
+          <a:xfrm>
+            <a:off x="750242" y="632990"/>
+            <a:ext cx="4062643" cy="1043409"/>
+          </a:xfrm>
+        </p:spPr>
+        <p:txBody>
+          <a:bodyPr>
+            <a:normAutofit/>
+          </a:bodyPr>
+          <a:lstStyle/>
+          <a:p>
+            <a:r>
+              <a:rPr lang="en-US" sz="3300">
+                <a:latin typeface="Times New Roman" panose="02020603050405020304" pitchFamily="18" charset="0"/>
+                <a:cs typeface="Times New Roman" panose="02020603050405020304" pitchFamily="18" charset="0"/>
+              </a:rPr>
               <a:t>If I could do it all over again, I would…</a:t>
             </a:r>
           </a:p>
@@ -3625,10 +4461,10 @@
       </p:sp>
       <p:sp>
         <p:nvSpPr>
-          <p:cNvPr id="3" name="Content Placeholder 2">
-            <a:extLst>
-              <a:ext uri="{FF2B5EF4-FFF2-40B4-BE49-F238E27FC236}">
-                <a16:creationId xmlns:a16="http://schemas.microsoft.com/office/drawing/2014/main" id="{226FDF05-BDD3-4ED3-9918-F97DF40E13FB}"/>
+          <p:cNvPr id="2054" name="Content Placeholder 2053">
+            <a:extLst>
+              <a:ext uri="{FF2B5EF4-FFF2-40B4-BE49-F238E27FC236}">
+                <a16:creationId xmlns:a16="http://schemas.microsoft.com/office/drawing/2014/main" id="{6C53595D-CF99-47AC-A7C3-C4DD569C0DFB}"/>
               </a:ext>
             </a:extLst>
           </p:cNvPr>
@@ -3639,12 +4475,46 @@
             <p:ph idx="1"/>
           </p:nvPr>
         </p:nvSpPr>
-        <p:spPr/>
-        <p:txBody>
-          <a:bodyPr/>
-          <a:lstStyle/>
-          <a:p>
-            <a:endParaRPr lang="en-US"/>
+        <p:spPr>
+          <a:xfrm>
+            <a:off x="520242" y="1774372"/>
+            <a:ext cx="4062642" cy="2754086"/>
+          </a:xfrm>
+        </p:spPr>
+        <p:txBody>
+          <a:bodyPr anchor="t">
+            <a:normAutofit/>
+          </a:bodyPr>
+          <a:lstStyle/>
+          <a:p>
+            <a:r>
+              <a:rPr lang="en-US" sz="2500" dirty="0">
+                <a:latin typeface="Times New Roman" panose="02020603050405020304" pitchFamily="18" charset="0"/>
+                <a:cs typeface="Times New Roman" panose="02020603050405020304" pitchFamily="18" charset="0"/>
+              </a:rPr>
+              <a:t>Using a database in order to keep track of computer parts </a:t>
+            </a:r>
+          </a:p>
+          <a:p>
+            <a:r>
+              <a:rPr lang="en-US" sz="2500" dirty="0">
+                <a:latin typeface="Times New Roman" panose="02020603050405020304" pitchFamily="18" charset="0"/>
+                <a:cs typeface="Times New Roman" panose="02020603050405020304" pitchFamily="18" charset="0"/>
+              </a:rPr>
+              <a:t>Instead of using console use a GUI</a:t>
+            </a:r>
+          </a:p>
+          <a:p>
+            <a:endParaRPr lang="en-US" sz="1800" dirty="0">
+              <a:latin typeface="Times New Roman" panose="02020603050405020304" pitchFamily="18" charset="0"/>
+              <a:cs typeface="Times New Roman" panose="02020603050405020304" pitchFamily="18" charset="0"/>
+            </a:endParaRPr>
+          </a:p>
+          <a:p>
+            <a:endParaRPr lang="en-US" sz="1800" dirty="0">
+              <a:latin typeface="Times New Roman" panose="02020603050405020304" pitchFamily="18" charset="0"/>
+              <a:cs typeface="Times New Roman" panose="02020603050405020304" pitchFamily="18" charset="0"/>
+            </a:endParaRPr>
           </a:p>
         </p:txBody>
       </p:sp>
@@ -3664,6 +4534,14 @@
 <file path=ppt/slides/slide5.xml><?xml version="1.0" encoding="utf-8"?>
 <p:sld xmlns:a="http://schemas.openxmlformats.org/drawingml/2006/main" xmlns:r="http://schemas.openxmlformats.org/officeDocument/2006/relationships" xmlns:p="http://schemas.openxmlformats.org/presentationml/2006/main">
   <p:cSld>
+    <p:bg>
+      <p:bgPr>
+        <a:solidFill>
+          <a:schemeClr val="bg1"/>
+        </a:solidFill>
+        <a:effectLst/>
+      </p:bgPr>
+    </p:bg>
     <p:spTree>
       <p:nvGrpSpPr>
         <p:cNvPr id="1" name=""/>
@@ -3678,6 +4556,193 @@
           <a:chExt cx="0" cy="0"/>
         </a:xfrm>
       </p:grpSpPr>
+      <p:pic>
+        <p:nvPicPr>
+          <p:cNvPr id="5122" name="Picture 2" descr="Learning to code: The business necessity of today">
+            <a:extLst>
+              <a:ext uri="{FF2B5EF4-FFF2-40B4-BE49-F238E27FC236}">
+                <a16:creationId xmlns:a16="http://schemas.microsoft.com/office/drawing/2014/main" id="{7C047707-B32E-4BEC-9872-0828056F2695}"/>
+              </a:ext>
+            </a:extLst>
+          </p:cNvPr>
+          <p:cNvPicPr>
+            <a:picLocks noChangeAspect="1" noChangeArrowheads="1"/>
+          </p:cNvPicPr>
+          <p:nvPr/>
+        </p:nvPicPr>
+        <p:blipFill rotWithShape="1">
+          <a:blip r:embed="rId2">
+            <a:extLst>
+              <a:ext uri="{28A0092B-C50C-407E-A947-70E740481C1C}">
+                <a14:useLocalDpi xmlns:a14="http://schemas.microsoft.com/office/drawing/2010/main" val="0"/>
+              </a:ext>
+            </a:extLst>
+          </a:blip>
+          <a:srcRect t="11914" b="3816"/>
+          <a:stretch/>
+        </p:blipFill>
+        <p:spPr bwMode="auto">
+          <a:xfrm>
+            <a:off x="20" y="10"/>
+            <a:ext cx="12191980" cy="6857990"/>
+          </a:xfrm>
+          <a:prstGeom prst="rect">
+            <a:avLst/>
+          </a:prstGeom>
+          <a:noFill/>
+          <a:extLst>
+            <a:ext uri="{909E8E84-426E-40DD-AFC4-6F175D3DCCD1}">
+              <a14:hiddenFill xmlns:a14="http://schemas.microsoft.com/office/drawing/2010/main">
+                <a:solidFill>
+                  <a:srgbClr val="FFFFFF"/>
+                </a:solidFill>
+              </a14:hiddenFill>
+            </a:ext>
+          </a:extLst>
+        </p:spPr>
+      </p:pic>
+      <p:sp>
+        <p:nvSpPr>
+          <p:cNvPr id="139" name="Freeform 5">
+            <a:extLst>
+              <a:ext uri="{FF2B5EF4-FFF2-40B4-BE49-F238E27FC236}">
+                <a16:creationId xmlns:a16="http://schemas.microsoft.com/office/drawing/2014/main" id="{3CD9DF72-87A3-404E-A828-84CBF11A8303}"/>
+              </a:ext>
+              <a:ext uri="{C183D7F6-B498-43B3-948B-1728B52AA6E4}">
+                <adec:decorative xmlns:adec="http://schemas.microsoft.com/office/drawing/2017/decorative" val="1"/>
+              </a:ext>
+            </a:extLst>
+          </p:cNvPr>
+          <p:cNvSpPr>
+            <a:spLocks noGrp="1" noRot="1" noChangeAspect="1" noMove="1" noResize="1" noEditPoints="1" noAdjustHandles="1" noChangeArrowheads="1" noChangeShapeType="1" noTextEdit="1"/>
+          </p:cNvSpPr>
+          <p:nvPr>
+            <p:extLst>
+              <p:ext uri="{386F3935-93C4-4BCD-93E2-E3B085C9AB24}">
+                <p16:designElem xmlns:p16="http://schemas.microsoft.com/office/powerpoint/2015/main" val="1"/>
+              </p:ext>
+            </p:extLst>
+          </p:nvPr>
+        </p:nvSpPr>
+        <p:spPr bwMode="grayWhite">
+          <a:xfrm flipH="1">
+            <a:off x="0" y="998175"/>
+            <a:ext cx="6017172" cy="5859825"/>
+          </a:xfrm>
+          <a:custGeom>
+            <a:avLst/>
+            <a:gdLst>
+              <a:gd name="T0" fmla="*/ 1333 w 1333"/>
+              <a:gd name="T1" fmla="*/ 1031 h 1298"/>
+              <a:gd name="T2" fmla="*/ 1333 w 1333"/>
+              <a:gd name="T3" fmla="*/ 380 h 1298"/>
+              <a:gd name="T4" fmla="*/ 706 w 1333"/>
+              <a:gd name="T5" fmla="*/ 0 h 1298"/>
+              <a:gd name="T6" fmla="*/ 0 w 1333"/>
+              <a:gd name="T7" fmla="*/ 706 h 1298"/>
+              <a:gd name="T8" fmla="*/ 323 w 1333"/>
+              <a:gd name="T9" fmla="*/ 1298 h 1298"/>
+              <a:gd name="T10" fmla="*/ 1090 w 1333"/>
+              <a:gd name="T11" fmla="*/ 1298 h 1298"/>
+              <a:gd name="T12" fmla="*/ 1333 w 1333"/>
+              <a:gd name="T13" fmla="*/ 1031 h 1298"/>
+            </a:gdLst>
+            <a:ahLst/>
+            <a:cxnLst>
+              <a:cxn ang="0">
+                <a:pos x="T0" y="T1"/>
+              </a:cxn>
+              <a:cxn ang="0">
+                <a:pos x="T2" y="T3"/>
+              </a:cxn>
+              <a:cxn ang="0">
+                <a:pos x="T4" y="T5"/>
+              </a:cxn>
+              <a:cxn ang="0">
+                <a:pos x="T6" y="T7"/>
+              </a:cxn>
+              <a:cxn ang="0">
+                <a:pos x="T8" y="T9"/>
+              </a:cxn>
+              <a:cxn ang="0">
+                <a:pos x="T10" y="T11"/>
+              </a:cxn>
+              <a:cxn ang="0">
+                <a:pos x="T12" y="T13"/>
+              </a:cxn>
+            </a:cxnLst>
+            <a:rect l="0" t="0" r="r" b="b"/>
+            <a:pathLst>
+              <a:path w="1333" h="1298">
+                <a:moveTo>
+                  <a:pt x="1333" y="1031"/>
+                </a:moveTo>
+                <a:cubicBezTo>
+                  <a:pt x="1333" y="380"/>
+                  <a:pt x="1333" y="380"/>
+                  <a:pt x="1333" y="380"/>
+                </a:cubicBezTo>
+                <a:cubicBezTo>
+                  <a:pt x="1215" y="154"/>
+                  <a:pt x="979" y="0"/>
+                  <a:pt x="706" y="0"/>
+                </a:cubicBezTo>
+                <a:cubicBezTo>
+                  <a:pt x="317" y="0"/>
+                  <a:pt x="0" y="316"/>
+                  <a:pt x="0" y="706"/>
+                </a:cubicBezTo>
+                <a:cubicBezTo>
+                  <a:pt x="0" y="954"/>
+                  <a:pt x="129" y="1172"/>
+                  <a:pt x="323" y="1298"/>
+                </a:cubicBezTo>
+                <a:cubicBezTo>
+                  <a:pt x="1090" y="1298"/>
+                  <a:pt x="1090" y="1298"/>
+                  <a:pt x="1090" y="1298"/>
+                </a:cubicBezTo>
+                <a:cubicBezTo>
+                  <a:pt x="1193" y="1232"/>
+                  <a:pt x="1276" y="1140"/>
+                  <a:pt x="1333" y="1031"/>
+                </a:cubicBezTo>
+                <a:close/>
+              </a:path>
+            </a:pathLst>
+          </a:custGeom>
+          <a:solidFill>
+            <a:schemeClr val="bg1">
+              <a:alpha val="75000"/>
+            </a:schemeClr>
+          </a:solidFill>
+          <a:ln w="50800" cap="sq" cmpd="dbl">
+            <a:noFill/>
+            <a:miter lim="800000"/>
+          </a:ln>
+          <a:effectLst/>
+        </p:spPr>
+        <p:txBody>
+          <a:bodyPr vert="horz" lIns="91440" tIns="45720" rIns="91440" bIns="45720" rtlCol="0" anchor="t">
+            <a:normAutofit/>
+          </a:bodyPr>
+          <a:lstStyle/>
+          <a:p>
+            <a:pPr algn="ctr">
+              <a:spcAft>
+                <a:spcPts val="1000"/>
+              </a:spcAft>
+              <a:buClr>
+                <a:schemeClr val="tx1"/>
+              </a:buClr>
+              <a:buSzPct val="100000"/>
+              <a:buFont typeface="Arial"/>
+              <a:buNone/>
+            </a:pPr>
+            <a:endParaRPr lang="en-US" sz="1600" cap="all"/>
+          </a:p>
+        </p:txBody>
+      </p:sp>
       <p:sp>
         <p:nvSpPr>
           <p:cNvPr id="2" name="Title 1">
@@ -3694,28 +4759,91 @@
             <p:ph type="title"/>
           </p:nvPr>
         </p:nvSpPr>
-        <p:spPr/>
-        <p:txBody>
-          <a:bodyPr/>
-          <a:lstStyle/>
-          <a:p>
-            <a:r>
-              <a:rPr lang="en-US" dirty="0"/>
-              <a:t>The thing that I learned the </a:t>
-            </a:r>
-            <a:r>
-              <a:rPr lang="en-US"/>
-              <a:t>most was…</a:t>
-            </a:r>
-          </a:p>
-        </p:txBody>
-      </p:sp>
-      <p:sp>
-        <p:nvSpPr>
-          <p:cNvPr id="3" name="Content Placeholder 2">
-            <a:extLst>
-              <a:ext uri="{FF2B5EF4-FFF2-40B4-BE49-F238E27FC236}">
-                <a16:creationId xmlns:a16="http://schemas.microsoft.com/office/drawing/2014/main" id="{3B9F6F6C-9EA1-41B0-A5EE-16156249074D}"/>
+        <p:spPr>
+          <a:xfrm>
+            <a:off x="709448" y="1913950"/>
+            <a:ext cx="4204137" cy="1342754"/>
+          </a:xfrm>
+        </p:spPr>
+        <p:txBody>
+          <a:bodyPr>
+            <a:normAutofit/>
+          </a:bodyPr>
+          <a:lstStyle/>
+          <a:p>
+            <a:pPr algn="ctr"/>
+            <a:r>
+              <a:rPr lang="en-US" sz="3300" dirty="0">
+                <a:latin typeface="Times New Roman" panose="02020603050405020304" pitchFamily="18" charset="0"/>
+                <a:cs typeface="Times New Roman" panose="02020603050405020304" pitchFamily="18" charset="0"/>
+              </a:rPr>
+              <a:t>The thing that I learned the most was…</a:t>
+            </a:r>
+          </a:p>
+        </p:txBody>
+      </p:sp>
+      <p:cxnSp>
+        <p:nvCxnSpPr>
+          <p:cNvPr id="141" name="Straight Connector 140">
+            <a:extLst>
+              <a:ext uri="{FF2B5EF4-FFF2-40B4-BE49-F238E27FC236}">
+                <a16:creationId xmlns:a16="http://schemas.microsoft.com/office/drawing/2014/main" id="{20E3A342-4D61-4E3F-AF90-1AB42AEB96CC}"/>
+              </a:ext>
+              <a:ext uri="{C183D7F6-B498-43B3-948B-1728B52AA6E4}">
+                <adec:decorative xmlns:adec="http://schemas.microsoft.com/office/drawing/2017/decorative" val="1"/>
+              </a:ext>
+            </a:extLst>
+          </p:cNvPr>
+          <p:cNvCxnSpPr>
+            <a:cxnSpLocks noGrp="1" noRot="1" noChangeAspect="1" noMove="1" noResize="1" noEditPoints="1" noAdjustHandles="1" noChangeArrowheads="1" noChangeShapeType="1"/>
+          </p:cNvCxnSpPr>
+          <p:nvPr>
+            <p:extLst>
+              <p:ext uri="{386F3935-93C4-4BCD-93E2-E3B085C9AB24}">
+                <p16:designElem xmlns:p16="http://schemas.microsoft.com/office/powerpoint/2015/main" val="1"/>
+              </p:ext>
+            </p:extLst>
+          </p:nvPr>
+        </p:nvCxnSpPr>
+        <p:spPr>
+          <a:xfrm>
+            <a:off x="2287051" y="3337139"/>
+            <a:ext cx="935420" cy="0"/>
+          </a:xfrm>
+          <a:prstGeom prst="line">
+            <a:avLst/>
+          </a:prstGeom>
+          <a:ln w="25400" cap="sq">
+            <a:solidFill>
+              <a:schemeClr val="tx1">
+                <a:lumMod val="85000"/>
+                <a:lumOff val="15000"/>
+              </a:schemeClr>
+            </a:solidFill>
+            <a:bevel/>
+          </a:ln>
+        </p:spPr>
+        <p:style>
+          <a:lnRef idx="1">
+            <a:schemeClr val="accent1"/>
+          </a:lnRef>
+          <a:fillRef idx="0">
+            <a:schemeClr val="accent1"/>
+          </a:fillRef>
+          <a:effectRef idx="0">
+            <a:schemeClr val="accent1"/>
+          </a:effectRef>
+          <a:fontRef idx="minor">
+            <a:schemeClr val="tx1"/>
+          </a:fontRef>
+        </p:style>
+      </p:cxnSp>
+      <p:sp>
+        <p:nvSpPr>
+          <p:cNvPr id="5126" name="Content Placeholder 5125">
+            <a:extLst>
+              <a:ext uri="{FF2B5EF4-FFF2-40B4-BE49-F238E27FC236}">
+                <a16:creationId xmlns:a16="http://schemas.microsoft.com/office/drawing/2014/main" id="{6CBB0E1E-13A7-43DD-A840-0E6C548A7383}"/>
               </a:ext>
             </a:extLst>
           </p:cNvPr>
@@ -3726,12 +4854,62 @@
             <p:ph idx="1"/>
           </p:nvPr>
         </p:nvSpPr>
-        <p:spPr/>
-        <p:txBody>
-          <a:bodyPr/>
-          <a:lstStyle/>
-          <a:p>
-            <a:endParaRPr lang="en-US"/>
+        <p:spPr>
+          <a:xfrm>
+            <a:off x="525516" y="3417573"/>
+            <a:ext cx="4593021" cy="2619839"/>
+          </a:xfrm>
+        </p:spPr>
+        <p:txBody>
+          <a:bodyPr anchor="ctr">
+            <a:normAutofit/>
+          </a:bodyPr>
+          <a:lstStyle/>
+          <a:p>
+            <a:r>
+              <a:rPr lang="en-US" sz="2500" dirty="0">
+                <a:latin typeface="Times New Roman" panose="02020603050405020304" pitchFamily="18" charset="0"/>
+                <a:cs typeface="Times New Roman" panose="02020603050405020304" pitchFamily="18" charset="0"/>
+              </a:rPr>
+              <a:t>Better understanding of the implementation of </a:t>
+            </a:r>
+            <a:r>
+              <a:rPr lang="en-US" sz="2500" dirty="0" err="1">
+                <a:latin typeface="Times New Roman" panose="02020603050405020304" pitchFamily="18" charset="0"/>
+                <a:cs typeface="Times New Roman" panose="02020603050405020304" pitchFamily="18" charset="0"/>
+              </a:rPr>
+              <a:t>unordered_maps</a:t>
+            </a:r>
+            <a:endParaRPr lang="en-US" sz="2500" dirty="0">
+              <a:latin typeface="Times New Roman" panose="02020603050405020304" pitchFamily="18" charset="0"/>
+              <a:cs typeface="Times New Roman" panose="02020603050405020304" pitchFamily="18" charset="0"/>
+            </a:endParaRPr>
+          </a:p>
+          <a:p>
+            <a:r>
+              <a:rPr lang="en-US" sz="2500" dirty="0">
+                <a:latin typeface="Times New Roman" panose="02020603050405020304" pitchFamily="18" charset="0"/>
+                <a:cs typeface="Times New Roman" panose="02020603050405020304" pitchFamily="18" charset="0"/>
+              </a:rPr>
+              <a:t>How helpful function parameters may be if you think of how they can be used outside </a:t>
+            </a:r>
+            <a:r>
+              <a:rPr lang="en-US" sz="2500">
+                <a:latin typeface="Times New Roman" panose="02020603050405020304" pitchFamily="18" charset="0"/>
+                <a:cs typeface="Times New Roman" panose="02020603050405020304" pitchFamily="18" charset="0"/>
+              </a:rPr>
+              <a:t>of the box </a:t>
+            </a:r>
+            <a:endParaRPr lang="en-US" sz="2500" dirty="0">
+              <a:latin typeface="Times New Roman" panose="02020603050405020304" pitchFamily="18" charset="0"/>
+              <a:cs typeface="Times New Roman" panose="02020603050405020304" pitchFamily="18" charset="0"/>
+            </a:endParaRPr>
+          </a:p>
+          <a:p>
+            <a:endParaRPr lang="en-US" sz="2500" dirty="0">
+              <a:latin typeface="Times New Roman" panose="02020603050405020304" pitchFamily="18" charset="0"/>
+              <a:cs typeface="Times New Roman" panose="02020603050405020304" pitchFamily="18" charset="0"/>
+            </a:endParaRPr>
           </a:p>
         </p:txBody>
       </p:sp>
@@ -3739,96 +4917,6 @@
     <p:extLst>
       <p:ext uri="{BB962C8B-B14F-4D97-AF65-F5344CB8AC3E}">
         <p14:creationId xmlns:p14="http://schemas.microsoft.com/office/powerpoint/2010/main" val="2365300709"/>
-      </p:ext>
-    </p:extLst>
-  </p:cSld>
-  <p:clrMapOvr>
-    <a:masterClrMapping/>
-  </p:clrMapOvr>
-</p:sld>
-</file>
-
-<file path=ppt/slides/slide6.xml><?xml version="1.0" encoding="utf-8"?>
-<p:sld xmlns:a="http://schemas.openxmlformats.org/drawingml/2006/main" xmlns:r="http://schemas.openxmlformats.org/officeDocument/2006/relationships" xmlns:p="http://schemas.openxmlformats.org/presentationml/2006/main">
-  <p:cSld>
-    <p:spTree>
-      <p:nvGrpSpPr>
-        <p:cNvPr id="1" name=""/>
-        <p:cNvGrpSpPr/>
-        <p:nvPr/>
-      </p:nvGrpSpPr>
-      <p:grpSpPr>
-        <a:xfrm>
-          <a:off x="0" y="0"/>
-          <a:ext cx="0" cy="0"/>
-          <a:chOff x="0" y="0"/>
-          <a:chExt cx="0" cy="0"/>
-        </a:xfrm>
-      </p:grpSpPr>
-      <p:sp>
-        <p:nvSpPr>
-          <p:cNvPr id="2" name="Title 1">
-            <a:extLst>
-              <a:ext uri="{FF2B5EF4-FFF2-40B4-BE49-F238E27FC236}">
-                <a16:creationId xmlns:a16="http://schemas.microsoft.com/office/drawing/2014/main" id="{87BDE59A-EAAD-4F5A-A104-E45044AB50AB}"/>
-              </a:ext>
-            </a:extLst>
-          </p:cNvPr>
-          <p:cNvSpPr>
-            <a:spLocks noGrp="1"/>
-          </p:cNvSpPr>
-          <p:nvPr>
-            <p:ph type="title"/>
-          </p:nvPr>
-        </p:nvSpPr>
-        <p:spPr/>
-        <p:txBody>
-          <a:bodyPr/>
-          <a:lstStyle/>
-          <a:p>
-            <a:r>
-              <a:rPr lang="en-US" dirty="0"/>
-              <a:t>Feel free to add one or two more slides to discuss whatever else you’d like</a:t>
-            </a:r>
-          </a:p>
-        </p:txBody>
-      </p:sp>
-      <p:sp>
-        <p:nvSpPr>
-          <p:cNvPr id="3" name="Content Placeholder 2">
-            <a:extLst>
-              <a:ext uri="{FF2B5EF4-FFF2-40B4-BE49-F238E27FC236}">
-                <a16:creationId xmlns:a16="http://schemas.microsoft.com/office/drawing/2014/main" id="{19E82C0B-C6AD-4449-86D0-7C211B39CCB6}"/>
-              </a:ext>
-            </a:extLst>
-          </p:cNvPr>
-          <p:cNvSpPr>
-            <a:spLocks noGrp="1"/>
-          </p:cNvSpPr>
-          <p:nvPr>
-            <p:ph idx="1"/>
-          </p:nvPr>
-        </p:nvSpPr>
-        <p:spPr/>
-        <p:txBody>
-          <a:bodyPr/>
-          <a:lstStyle/>
-          <a:p>
-            <a:r>
-              <a:rPr lang="en-US" dirty="0"/>
-              <a:t>(</a:t>
-            </a:r>
-            <a:r>
-              <a:rPr lang="en-US"/>
-              <a:t>not required)</a:t>
-            </a:r>
-          </a:p>
-        </p:txBody>
-      </p:sp>
-    </p:spTree>
-    <p:extLst>
-      <p:ext uri="{BB962C8B-B14F-4D97-AF65-F5344CB8AC3E}">
-        <p14:creationId xmlns:p14="http://schemas.microsoft.com/office/powerpoint/2010/main" val="3910685935"/>
       </p:ext>
     </p:extLst>
   </p:cSld>

</xml_diff>